<commit_message>
Ajustada apresentação 5 e 6
</commit_message>
<xml_diff>
--- a/Controlando versões com Git e Github - Capítulo V.pptx
+++ b/Controlando versões com Git e Github - Capítulo V.pptx
@@ -304,7 +304,7 @@
             <a:fld id="{08B9EBBA-996F-894A-B54A-D6246ED52CEA}" type="datetimeFigureOut">
               <a:rPr lang="en-US" smtClean="0"/>
               <a:pPr/>
-              <a:t>9/30/2020</a:t>
+              <a:t>10/5/2020</a:t>
             </a:fld>
             <a:endParaRPr lang="en-US" dirty="0"/>
           </a:p>
@@ -476,7 +476,7 @@
             <a:fld id="{C6C52C72-DE31-F449-A4ED-4C594FD91407}" type="datetimeFigureOut">
               <a:rPr lang="en-US" smtClean="0"/>
               <a:pPr/>
-              <a:t>9/30/2020</a:t>
+              <a:t>10/5/2020</a:t>
             </a:fld>
             <a:endParaRPr lang="en-US" dirty="0"/>
           </a:p>
@@ -658,7 +658,7 @@
             <a:fld id="{ED62726E-379B-B349-9EED-81ED093FA806}" type="datetimeFigureOut">
               <a:rPr lang="en-US" smtClean="0"/>
               <a:pPr/>
-              <a:t>9/30/2020</a:t>
+              <a:t>10/5/2020</a:t>
             </a:fld>
             <a:endParaRPr lang="en-US" dirty="0"/>
           </a:p>
@@ -830,7 +830,7 @@
             <a:fld id="{9B3A1323-8D79-1946-B0D7-40001CF92E9D}" type="datetimeFigureOut">
               <a:rPr lang="en-US" smtClean="0"/>
               <a:pPr/>
-              <a:t>9/30/2020</a:t>
+              <a:t>10/5/2020</a:t>
             </a:fld>
             <a:endParaRPr lang="en-US" dirty="0"/>
           </a:p>
@@ -1100,7 +1100,7 @@
             <a:fld id="{8DFA1846-DA80-1C48-A609-854EA85C59AD}" type="datetimeFigureOut">
               <a:rPr lang="en-US" smtClean="0"/>
               <a:pPr/>
-              <a:t>9/30/2020</a:t>
+              <a:t>10/5/2020</a:t>
             </a:fld>
             <a:endParaRPr lang="en-US" dirty="0"/>
           </a:p>
@@ -1334,7 +1334,7 @@
             <a:fld id="{57302355-E14B-8545-A8F8-0FE83CC9D524}" type="datetimeFigureOut">
               <a:rPr lang="en-US" smtClean="0"/>
               <a:pPr/>
-              <a:t>9/30/2020</a:t>
+              <a:t>10/5/2020</a:t>
             </a:fld>
             <a:endParaRPr lang="en-US" dirty="0"/>
           </a:p>
@@ -1695,7 +1695,7 @@
             <a:fld id="{09B482E8-6E0E-1B4F-B1FD-C69DB9E858D9}" type="datetimeFigureOut">
               <a:rPr lang="en-US" smtClean="0"/>
               <a:pPr/>
-              <a:t>9/30/2020</a:t>
+              <a:t>10/5/2020</a:t>
             </a:fld>
             <a:endParaRPr lang="en-US" dirty="0"/>
           </a:p>
@@ -1839,7 +1839,7 @@
             <a:fld id="{F13A34C8-038E-2045-AF43-DF7DBB8E0E9E}" type="datetimeFigureOut">
               <a:rPr lang="en-US" smtClean="0"/>
               <a:pPr/>
-              <a:t>9/30/2020</a:t>
+              <a:t>10/5/2020</a:t>
             </a:fld>
             <a:endParaRPr lang="en-US" dirty="0"/>
           </a:p>
@@ -1936,7 +1936,7 @@
             <a:fld id="{8818C68F-D26B-8F47-958C-23B49CF8A634}" type="datetimeFigureOut">
               <a:rPr lang="en-US" smtClean="0"/>
               <a:pPr/>
-              <a:t>9/30/2020</a:t>
+              <a:t>10/5/2020</a:t>
             </a:fld>
             <a:endParaRPr lang="en-US" dirty="0"/>
           </a:p>
@@ -2295,7 +2295,7 @@
             <a:fld id="{D0DF5E60-9974-AC48-9591-99C2BB44B7CF}" type="datetimeFigureOut">
               <a:rPr lang="en-US" smtClean="0"/>
               <a:pPr/>
-              <a:t>9/30/2020</a:t>
+              <a:t>10/5/2020</a:t>
             </a:fld>
             <a:endParaRPr lang="en-US" dirty="0"/>
           </a:p>
@@ -2656,7 +2656,7 @@
             <a:fld id="{09B482E8-6E0E-1B4F-B1FD-C69DB9E858D9}" type="datetimeFigureOut">
               <a:rPr lang="en-US" smtClean="0"/>
               <a:pPr/>
-              <a:t>9/30/2020</a:t>
+              <a:t>10/5/2020</a:t>
             </a:fld>
             <a:endParaRPr lang="en-US" dirty="0"/>
           </a:p>
@@ -2903,7 +2903,7 @@
             <a:fld id="{09B482E8-6E0E-1B4F-B1FD-C69DB9E858D9}" type="datetimeFigureOut">
               <a:rPr lang="en-US" smtClean="0"/>
               <a:pPr/>
-              <a:t>9/30/2020</a:t>
+              <a:t>10/5/2020</a:t>
             </a:fld>
             <a:endParaRPr lang="en-US" dirty="0"/>
           </a:p>
@@ -3376,7 +3376,7 @@
           <p:cNvPr id="4" name="Title 1">
             <a:extLst>
               <a:ext uri="{FF2B5EF4-FFF2-40B4-BE49-F238E27FC236}">
-                <a16:creationId xmlns:a16="http://schemas.microsoft.com/office/drawing/2014/main" xmlns="" id="{854162F5-84C3-E248-B56A-B760B2963C40}"/>
+                <a16:creationId xmlns="" xmlns:a16="http://schemas.microsoft.com/office/drawing/2014/main" id="{854162F5-84C3-E248-B56A-B760B2963C40}"/>
               </a:ext>
             </a:extLst>
           </p:cNvPr>
@@ -3476,7 +3476,7 @@
           <p:cNvPr id="4" name="TextBox 3">
             <a:extLst>
               <a:ext uri="{FF2B5EF4-FFF2-40B4-BE49-F238E27FC236}">
-                <a16:creationId xmlns:a16="http://schemas.microsoft.com/office/drawing/2014/main" xmlns="" id="{B2C256AF-F888-3B4A-87A3-D123362DC6A8}"/>
+                <a16:creationId xmlns="" xmlns:a16="http://schemas.microsoft.com/office/drawing/2014/main" id="{B2C256AF-F888-3B4A-87A3-D123362DC6A8}"/>
               </a:ext>
             </a:extLst>
           </p:cNvPr>
@@ -3584,7 +3584,6 @@
               <a:rPr lang="pt-BR" sz="2400" b="1" dirty="0"/>
               <a:t>ENCONTRANDO PROJETOS E VISUALIZANDO CÓDIGO-FONTE</a:t>
             </a:r>
-            <a:endParaRPr lang="pt-BR" sz="2400" b="1" dirty="0"/>
           </a:p>
         </p:txBody>
       </p:sp>
@@ -3623,7 +3622,7 @@
           <p:cNvPr id="3" name="Picture 2">
             <a:extLst>
               <a:ext uri="{FF2B5EF4-FFF2-40B4-BE49-F238E27FC236}">
-                <a16:creationId xmlns:a16="http://schemas.microsoft.com/office/drawing/2014/main" xmlns="" id="{92A6F092-ACD0-964E-819A-CC60AFF9437A}"/>
+                <a16:creationId xmlns="" xmlns:a16="http://schemas.microsoft.com/office/drawing/2014/main" id="{92A6F092-ACD0-964E-819A-CC60AFF9437A}"/>
               </a:ext>
             </a:extLst>
           </p:cNvPr>
@@ -3745,7 +3744,7 @@
           <p:cNvPr id="4" name="Picture 3">
             <a:extLst>
               <a:ext uri="{FF2B5EF4-FFF2-40B4-BE49-F238E27FC236}">
-                <a16:creationId xmlns:a16="http://schemas.microsoft.com/office/drawing/2014/main" xmlns="" id="{4EECCC39-C13E-B048-8B9D-FEC4686E0E42}"/>
+                <a16:creationId xmlns="" xmlns:a16="http://schemas.microsoft.com/office/drawing/2014/main" id="{4EECCC39-C13E-B048-8B9D-FEC4686E0E42}"/>
               </a:ext>
             </a:extLst>
           </p:cNvPr>
@@ -3775,7 +3774,7 @@
           <p:cNvPr id="3" name="Title 1">
             <a:extLst>
               <a:ext uri="{FF2B5EF4-FFF2-40B4-BE49-F238E27FC236}">
-                <a16:creationId xmlns:a16="http://schemas.microsoft.com/office/drawing/2014/main" xmlns="" id="{A5280372-36A4-8549-A94B-69451B86F86B}"/>
+                <a16:creationId xmlns="" xmlns:a16="http://schemas.microsoft.com/office/drawing/2014/main" id="{A5280372-36A4-8549-A94B-69451B86F86B}"/>
               </a:ext>
             </a:extLst>
           </p:cNvPr>
@@ -3899,7 +3898,7 @@
           <p:cNvPr id="3" name="Picture 2">
             <a:extLst>
               <a:ext uri="{FF2B5EF4-FFF2-40B4-BE49-F238E27FC236}">
-                <a16:creationId xmlns:a16="http://schemas.microsoft.com/office/drawing/2014/main" xmlns="" id="{07D06F15-7779-6D4F-BAA7-E0B9EE8EBE3E}"/>
+                <a16:creationId xmlns="" xmlns:a16="http://schemas.microsoft.com/office/drawing/2014/main" id="{07D06F15-7779-6D4F-BAA7-E0B9EE8EBE3E}"/>
               </a:ext>
             </a:extLst>
           </p:cNvPr>
@@ -4021,7 +4020,7 @@
           <p:cNvPr id="5" name="Picture 4">
             <a:extLst>
               <a:ext uri="{FF2B5EF4-FFF2-40B4-BE49-F238E27FC236}">
-                <a16:creationId xmlns:a16="http://schemas.microsoft.com/office/drawing/2014/main" xmlns="" id="{0470BAD3-DCE0-E14B-8901-DF8695B2572D}"/>
+                <a16:creationId xmlns="" xmlns:a16="http://schemas.microsoft.com/office/drawing/2014/main" id="{0470BAD3-DCE0-E14B-8901-DF8695B2572D}"/>
               </a:ext>
             </a:extLst>
           </p:cNvPr>
@@ -4151,7 +4150,7 @@
           <p:cNvPr id="5" name="Picture 4">
             <a:extLst>
               <a:ext uri="{FF2B5EF4-FFF2-40B4-BE49-F238E27FC236}">
-                <a16:creationId xmlns:a16="http://schemas.microsoft.com/office/drawing/2014/main" xmlns="" id="{90A48F9B-EA6C-1C4E-9075-B20E4568378F}"/>
+                <a16:creationId xmlns="" xmlns:a16="http://schemas.microsoft.com/office/drawing/2014/main" id="{90A48F9B-EA6C-1C4E-9075-B20E4568378F}"/>
               </a:ext>
             </a:extLst>
           </p:cNvPr>
@@ -4277,7 +4276,7 @@
           <p:cNvPr id="2" name="Picture 1">
             <a:extLst>
               <a:ext uri="{FF2B5EF4-FFF2-40B4-BE49-F238E27FC236}">
-                <a16:creationId xmlns:a16="http://schemas.microsoft.com/office/drawing/2014/main" xmlns="" id="{B561644D-154E-774D-9AEB-729067EE3FFD}"/>
+                <a16:creationId xmlns="" xmlns:a16="http://schemas.microsoft.com/office/drawing/2014/main" id="{B561644D-154E-774D-9AEB-729067EE3FFD}"/>
               </a:ext>
             </a:extLst>
           </p:cNvPr>
@@ -4395,7 +4394,7 @@
           <p:cNvPr id="3" name="Picture 2">
             <a:extLst>
               <a:ext uri="{FF2B5EF4-FFF2-40B4-BE49-F238E27FC236}">
-                <a16:creationId xmlns:a16="http://schemas.microsoft.com/office/drawing/2014/main" xmlns="" id="{6DA8AB9C-C0E0-5E4F-B92E-DA1EC8A4EF58}"/>
+                <a16:creationId xmlns="" xmlns:a16="http://schemas.microsoft.com/office/drawing/2014/main" id="{6DA8AB9C-C0E0-5E4F-B92E-DA1EC8A4EF58}"/>
               </a:ext>
             </a:extLst>
           </p:cNvPr>
@@ -4513,7 +4512,7 @@
           <p:cNvPr id="4" name="TextBox 3">
             <a:extLst>
               <a:ext uri="{FF2B5EF4-FFF2-40B4-BE49-F238E27FC236}">
-                <a16:creationId xmlns:a16="http://schemas.microsoft.com/office/drawing/2014/main" xmlns="" id="{B2C256AF-F888-3B4A-87A3-D123362DC6A8}"/>
+                <a16:creationId xmlns="" xmlns:a16="http://schemas.microsoft.com/office/drawing/2014/main" id="{B2C256AF-F888-3B4A-87A3-D123362DC6A8}"/>
               </a:ext>
             </a:extLst>
           </p:cNvPr>
@@ -4732,7 +4731,7 @@
           <p:cNvPr id="4" name="Picture 3">
             <a:extLst>
               <a:ext uri="{FF2B5EF4-FFF2-40B4-BE49-F238E27FC236}">
-                <a16:creationId xmlns:a16="http://schemas.microsoft.com/office/drawing/2014/main" xmlns="" id="{3047F43D-07E5-514A-8D24-492F8498BADA}"/>
+                <a16:creationId xmlns="" xmlns:a16="http://schemas.microsoft.com/office/drawing/2014/main" id="{3047F43D-07E5-514A-8D24-492F8498BADA}"/>
               </a:ext>
             </a:extLst>
           </p:cNvPr>
@@ -4854,7 +4853,7 @@
           <p:cNvPr id="2" name="Title 1">
             <a:extLst>
               <a:ext uri="{FF2B5EF4-FFF2-40B4-BE49-F238E27FC236}">
-                <a16:creationId xmlns:a16="http://schemas.microsoft.com/office/drawing/2014/main" xmlns="" id="{73FD4F77-028A-7A47-BC41-2C419FC56E27}"/>
+                <a16:creationId xmlns="" xmlns:a16="http://schemas.microsoft.com/office/drawing/2014/main" id="{73FD4F77-028A-7A47-BC41-2C419FC56E27}"/>
               </a:ext>
             </a:extLst>
           </p:cNvPr>
@@ -4892,7 +4891,7 @@
           <p:cNvPr id="1026" name="Picture 2" descr="Git na prática — Parte 1 (Subindo projeto para o github).">
             <a:extLst>
               <a:ext uri="{FF2B5EF4-FFF2-40B4-BE49-F238E27FC236}">
-                <a16:creationId xmlns:a16="http://schemas.microsoft.com/office/drawing/2014/main" xmlns="" id="{C41C7762-29AF-DE4A-8B75-0AA40134A4CA}"/>
+                <a16:creationId xmlns="" xmlns:a16="http://schemas.microsoft.com/office/drawing/2014/main" id="{C41C7762-29AF-DE4A-8B75-0AA40134A4CA}"/>
               </a:ext>
             </a:extLst>
           </p:cNvPr>
@@ -4969,7 +4968,7 @@
           <p:cNvPr id="4" name="TextBox 3">
             <a:extLst>
               <a:ext uri="{FF2B5EF4-FFF2-40B4-BE49-F238E27FC236}">
-                <a16:creationId xmlns:a16="http://schemas.microsoft.com/office/drawing/2014/main" xmlns="" id="{B2C256AF-F888-3B4A-87A3-D123362DC6A8}"/>
+                <a16:creationId xmlns="" xmlns:a16="http://schemas.microsoft.com/office/drawing/2014/main" id="{B2C256AF-F888-3B4A-87A3-D123362DC6A8}"/>
               </a:ext>
             </a:extLst>
           </p:cNvPr>
@@ -5139,7 +5138,7 @@
           <p:cNvPr id="4" name="TextBox 3">
             <a:extLst>
               <a:ext uri="{FF2B5EF4-FFF2-40B4-BE49-F238E27FC236}">
-                <a16:creationId xmlns:a16="http://schemas.microsoft.com/office/drawing/2014/main" xmlns="" id="{B2C256AF-F888-3B4A-87A3-D123362DC6A8}"/>
+                <a16:creationId xmlns="" xmlns:a16="http://schemas.microsoft.com/office/drawing/2014/main" id="{B2C256AF-F888-3B4A-87A3-D123362DC6A8}"/>
               </a:ext>
             </a:extLst>
           </p:cNvPr>
@@ -5298,7 +5297,7 @@
           <p:cNvPr id="4" name="TextBox 3">
             <a:extLst>
               <a:ext uri="{FF2B5EF4-FFF2-40B4-BE49-F238E27FC236}">
-                <a16:creationId xmlns:a16="http://schemas.microsoft.com/office/drawing/2014/main" xmlns="" id="{B2C256AF-F888-3B4A-87A3-D123362DC6A8}"/>
+                <a16:creationId xmlns="" xmlns:a16="http://schemas.microsoft.com/office/drawing/2014/main" id="{B2C256AF-F888-3B4A-87A3-D123362DC6A8}"/>
               </a:ext>
             </a:extLst>
           </p:cNvPr>
@@ -5497,7 +5496,7 @@
           <p:cNvPr id="4" name="Picture 3">
             <a:extLst>
               <a:ext uri="{FF2B5EF4-FFF2-40B4-BE49-F238E27FC236}">
-                <a16:creationId xmlns:a16="http://schemas.microsoft.com/office/drawing/2014/main" xmlns="" id="{C640F94E-08BC-0549-82A7-3465C1380D3E}"/>
+                <a16:creationId xmlns="" xmlns:a16="http://schemas.microsoft.com/office/drawing/2014/main" id="{C640F94E-08BC-0549-82A7-3465C1380D3E}"/>
               </a:ext>
             </a:extLst>
           </p:cNvPr>
@@ -5619,7 +5618,7 @@
           <p:cNvPr id="2" name="Picture 1">
             <a:extLst>
               <a:ext uri="{FF2B5EF4-FFF2-40B4-BE49-F238E27FC236}">
-                <a16:creationId xmlns:a16="http://schemas.microsoft.com/office/drawing/2014/main" xmlns="" id="{A99B9F11-EFED-7C44-A2AE-FE46D87BE96C}"/>
+                <a16:creationId xmlns="" xmlns:a16="http://schemas.microsoft.com/office/drawing/2014/main" id="{A99B9F11-EFED-7C44-A2AE-FE46D87BE96C}"/>
               </a:ext>
             </a:extLst>
           </p:cNvPr>
@@ -5741,7 +5740,7 @@
           <p:cNvPr id="4" name="TextBox 3">
             <a:extLst>
               <a:ext uri="{FF2B5EF4-FFF2-40B4-BE49-F238E27FC236}">
-                <a16:creationId xmlns:a16="http://schemas.microsoft.com/office/drawing/2014/main" xmlns="" id="{B2C256AF-F888-3B4A-87A3-D123362DC6A8}"/>
+                <a16:creationId xmlns="" xmlns:a16="http://schemas.microsoft.com/office/drawing/2014/main" id="{B2C256AF-F888-3B4A-87A3-D123362DC6A8}"/>
               </a:ext>
             </a:extLst>
           </p:cNvPr>
@@ -6092,7 +6091,7 @@
           <p:cNvPr id="4" name="TextBox 3">
             <a:extLst>
               <a:ext uri="{FF2B5EF4-FFF2-40B4-BE49-F238E27FC236}">
-                <a16:creationId xmlns:a16="http://schemas.microsoft.com/office/drawing/2014/main" xmlns="" id="{B2C256AF-F888-3B4A-87A3-D123362DC6A8}"/>
+                <a16:creationId xmlns="" xmlns:a16="http://schemas.microsoft.com/office/drawing/2014/main" id="{B2C256AF-F888-3B4A-87A3-D123362DC6A8}"/>
               </a:ext>
             </a:extLst>
           </p:cNvPr>
@@ -6313,7 +6312,7 @@
           <p:cNvPr id="4" name="Picture 3">
             <a:extLst>
               <a:ext uri="{FF2B5EF4-FFF2-40B4-BE49-F238E27FC236}">
-                <a16:creationId xmlns:a16="http://schemas.microsoft.com/office/drawing/2014/main" xmlns="" id="{AF971232-338B-8F4B-8F51-C6EC4DC20015}"/>
+                <a16:creationId xmlns="" xmlns:a16="http://schemas.microsoft.com/office/drawing/2014/main" id="{AF971232-338B-8F4B-8F51-C6EC4DC20015}"/>
               </a:ext>
             </a:extLst>
           </p:cNvPr>
@@ -6431,7 +6430,7 @@
           <p:cNvPr id="4" name="Picture 3">
             <a:extLst>
               <a:ext uri="{FF2B5EF4-FFF2-40B4-BE49-F238E27FC236}">
-                <a16:creationId xmlns:a16="http://schemas.microsoft.com/office/drawing/2014/main" xmlns="" id="{A531CF69-4D64-5744-B80F-E60D4F5A4E52}"/>
+                <a16:creationId xmlns="" xmlns:a16="http://schemas.microsoft.com/office/drawing/2014/main" id="{A531CF69-4D64-5744-B80F-E60D4F5A4E52}"/>
               </a:ext>
             </a:extLst>
           </p:cNvPr>
@@ -6549,7 +6548,7 @@
           <p:cNvPr id="4" name="Picture 3">
             <a:extLst>
               <a:ext uri="{FF2B5EF4-FFF2-40B4-BE49-F238E27FC236}">
-                <a16:creationId xmlns:a16="http://schemas.microsoft.com/office/drawing/2014/main" xmlns="" id="{1A4FF899-9F7B-5A48-8156-2CABC7F87DF3}"/>
+                <a16:creationId xmlns="" xmlns:a16="http://schemas.microsoft.com/office/drawing/2014/main" id="{1A4FF899-9F7B-5A48-8156-2CABC7F87DF3}"/>
               </a:ext>
             </a:extLst>
           </p:cNvPr>
@@ -6667,7 +6666,7 @@
           <p:cNvPr id="4" name="TextBox 3">
             <a:extLst>
               <a:ext uri="{FF2B5EF4-FFF2-40B4-BE49-F238E27FC236}">
-                <a16:creationId xmlns:a16="http://schemas.microsoft.com/office/drawing/2014/main" xmlns="" id="{B2C256AF-F888-3B4A-87A3-D123362DC6A8}"/>
+                <a16:creationId xmlns="" xmlns:a16="http://schemas.microsoft.com/office/drawing/2014/main" id="{B2C256AF-F888-3B4A-87A3-D123362DC6A8}"/>
               </a:ext>
             </a:extLst>
           </p:cNvPr>
@@ -6731,7 +6730,6 @@
               <a:rPr lang="pt-BR" sz="2400" b="1" dirty="0"/>
               <a:t>SERVIÇOS DE HOSPEDAGEM DE PROJETOS</a:t>
             </a:r>
-            <a:endParaRPr lang="pt-BR" sz="2400" b="1" dirty="0"/>
           </a:p>
         </p:txBody>
       </p:sp>
@@ -6770,7 +6768,7 @@
           <p:cNvPr id="4" name="TextBox 3">
             <a:extLst>
               <a:ext uri="{FF2B5EF4-FFF2-40B4-BE49-F238E27FC236}">
-                <a16:creationId xmlns:a16="http://schemas.microsoft.com/office/drawing/2014/main" xmlns="" id="{B2C256AF-F888-3B4A-87A3-D123362DC6A8}"/>
+                <a16:creationId xmlns="" xmlns:a16="http://schemas.microsoft.com/office/drawing/2014/main" id="{B2C256AF-F888-3B4A-87A3-D123362DC6A8}"/>
               </a:ext>
             </a:extLst>
           </p:cNvPr>
@@ -6867,7 +6865,6 @@
               <a:rPr lang="pt-BR" sz="2400" b="1" dirty="0"/>
               <a:t>SERVIÇOS DE HOSPEDAGEM DE PROJETOS</a:t>
             </a:r>
-            <a:endParaRPr lang="pt-BR" sz="2400" b="1" dirty="0"/>
           </a:p>
         </p:txBody>
       </p:sp>
@@ -6906,7 +6903,7 @@
           <p:cNvPr id="3074" name="Picture 2" descr="Como criar seu perfil no GitHub do Training Center - Training ...">
             <a:extLst>
               <a:ext uri="{FF2B5EF4-FFF2-40B4-BE49-F238E27FC236}">
-                <a16:creationId xmlns:a16="http://schemas.microsoft.com/office/drawing/2014/main" xmlns="" id="{14BEEB00-269E-A946-AEC6-66D367FFAF8D}"/>
+                <a16:creationId xmlns="" xmlns:a16="http://schemas.microsoft.com/office/drawing/2014/main" id="{14BEEB00-269E-A946-AEC6-66D367FFAF8D}"/>
               </a:ext>
             </a:extLst>
           </p:cNvPr>
@@ -6983,7 +6980,7 @@
           <p:cNvPr id="4" name="TextBox 3">
             <a:extLst>
               <a:ext uri="{FF2B5EF4-FFF2-40B4-BE49-F238E27FC236}">
-                <a16:creationId xmlns:a16="http://schemas.microsoft.com/office/drawing/2014/main" xmlns="" id="{B2C256AF-F888-3B4A-87A3-D123362DC6A8}"/>
+                <a16:creationId xmlns="" xmlns:a16="http://schemas.microsoft.com/office/drawing/2014/main" id="{B2C256AF-F888-3B4A-87A3-D123362DC6A8}"/>
               </a:ext>
             </a:extLst>
           </p:cNvPr>
@@ -7089,7 +7086,6 @@
               <a:rPr lang="pt-BR" sz="2400" b="1" dirty="0"/>
               <a:t>GITHUB: A REDE SOCIAL DOS DESENVOLVEDORES</a:t>
             </a:r>
-            <a:endParaRPr lang="pt-BR" sz="2400" b="1" dirty="0"/>
           </a:p>
         </p:txBody>
       </p:sp>
@@ -7128,7 +7124,7 @@
           <p:cNvPr id="4" name="TextBox 3">
             <a:extLst>
               <a:ext uri="{FF2B5EF4-FFF2-40B4-BE49-F238E27FC236}">
-                <a16:creationId xmlns:a16="http://schemas.microsoft.com/office/drawing/2014/main" xmlns="" id="{B2C256AF-F888-3B4A-87A3-D123362DC6A8}"/>
+                <a16:creationId xmlns="" xmlns:a16="http://schemas.microsoft.com/office/drawing/2014/main" id="{B2C256AF-F888-3B4A-87A3-D123362DC6A8}"/>
               </a:ext>
             </a:extLst>
           </p:cNvPr>
@@ -7210,7 +7206,6 @@
               <a:rPr lang="pt-BR" sz="2400" b="1" dirty="0"/>
               <a:t>GITHUB: A REDE SOCIAL DOS DESENVOLVEDORES</a:t>
             </a:r>
-            <a:endParaRPr lang="pt-BR" sz="2400" b="1" dirty="0"/>
           </a:p>
         </p:txBody>
       </p:sp>
@@ -7249,7 +7244,7 @@
           <p:cNvPr id="4" name="TextBox 3">
             <a:extLst>
               <a:ext uri="{FF2B5EF4-FFF2-40B4-BE49-F238E27FC236}">
-                <a16:creationId xmlns:a16="http://schemas.microsoft.com/office/drawing/2014/main" xmlns="" id="{B2C256AF-F888-3B4A-87A3-D123362DC6A8}"/>
+                <a16:creationId xmlns="" xmlns:a16="http://schemas.microsoft.com/office/drawing/2014/main" id="{B2C256AF-F888-3B4A-87A3-D123362DC6A8}"/>
               </a:ext>
             </a:extLst>
           </p:cNvPr>
@@ -7277,15 +7272,27 @@
               <a:buChar char="•"/>
             </a:pPr>
             <a:r>
-              <a:rPr lang="pt-BR" sz="2800" i="1" dirty="0" err="1"/>
+              <a:rPr lang="pt-BR" sz="2800" i="1" dirty="0" err="1">
+                <a:solidFill>
+                  <a:srgbClr val="FF0000"/>
+                </a:solidFill>
+              </a:rPr>
               <a:t>Issue</a:t>
             </a:r>
             <a:r>
-              <a:rPr lang="pt-BR" sz="2800" i="1" dirty="0"/>
+              <a:rPr lang="pt-BR" sz="2800" i="1" dirty="0">
+                <a:solidFill>
+                  <a:srgbClr val="FF0000"/>
+                </a:solidFill>
+              </a:rPr>
               <a:t> </a:t>
             </a:r>
             <a:r>
-              <a:rPr lang="pt-BR" sz="2800" i="1" dirty="0" err="1"/>
+              <a:rPr lang="pt-BR" sz="2800" i="1" dirty="0" err="1">
+                <a:solidFill>
+                  <a:srgbClr val="FF0000"/>
+                </a:solidFill>
+              </a:rPr>
               <a:t>Tracker</a:t>
             </a:r>
             <a:r>
@@ -7307,15 +7314,27 @@
               <a:buChar char="•"/>
             </a:pPr>
             <a:r>
-              <a:rPr lang="pt-BR" sz="2800" i="1" dirty="0" err="1"/>
+              <a:rPr lang="pt-BR" sz="2800" i="1" dirty="0" err="1">
+                <a:solidFill>
+                  <a:srgbClr val="FF0000"/>
+                </a:solidFill>
+              </a:rPr>
               <a:t>Pull</a:t>
             </a:r>
             <a:r>
-              <a:rPr lang="pt-BR" sz="2800" i="1" dirty="0"/>
+              <a:rPr lang="pt-BR" sz="2800" i="1" dirty="0">
+                <a:solidFill>
+                  <a:srgbClr val="FF0000"/>
+                </a:solidFill>
+              </a:rPr>
               <a:t> </a:t>
             </a:r>
             <a:r>
-              <a:rPr lang="pt-BR" sz="2800" i="1" dirty="0" err="1"/>
+              <a:rPr lang="pt-BR" sz="2800" i="1" dirty="0" err="1">
+                <a:solidFill>
+                  <a:srgbClr val="FF0000"/>
+                </a:solidFill>
+              </a:rPr>
               <a:t>Requests</a:t>
             </a:r>
             <a:r>
@@ -7337,15 +7356,27 @@
               <a:buChar char="•"/>
             </a:pPr>
             <a:r>
-              <a:rPr lang="pt-BR" sz="2800" i="1" dirty="0" err="1"/>
+              <a:rPr lang="pt-BR" sz="2800" i="1" dirty="0" err="1">
+                <a:solidFill>
+                  <a:srgbClr val="FF0000"/>
+                </a:solidFill>
+              </a:rPr>
               <a:t>Commit</a:t>
             </a:r>
             <a:r>
-              <a:rPr lang="pt-BR" sz="2800" i="1" dirty="0"/>
+              <a:rPr lang="pt-BR" sz="2800" i="1" dirty="0">
+                <a:solidFill>
+                  <a:srgbClr val="FF0000"/>
+                </a:solidFill>
+              </a:rPr>
               <a:t> </a:t>
             </a:r>
             <a:r>
-              <a:rPr lang="pt-BR" sz="2800" i="1" dirty="0" err="1"/>
+              <a:rPr lang="pt-BR" sz="2800" i="1" dirty="0" err="1">
+                <a:solidFill>
+                  <a:srgbClr val="FF0000"/>
+                </a:solidFill>
+              </a:rPr>
               <a:t>Comments</a:t>
             </a:r>
             <a:r>
@@ -7353,7 +7384,11 @@
               <a:t>: usuários enviam comentários e discutem modificações no código de um determinado </a:t>
             </a:r>
             <a:r>
-              <a:rPr lang="pt-BR" sz="2800" dirty="0" err="1"/>
+              <a:rPr lang="pt-BR" sz="2800" dirty="0" err="1">
+                <a:solidFill>
+                  <a:srgbClr val="FF0000"/>
+                </a:solidFill>
+              </a:rPr>
               <a:t>commit</a:t>
             </a:r>
             <a:r>
@@ -7390,7 +7425,6 @@
               <a:rPr lang="pt-BR" sz="2400" b="1" dirty="0"/>
               <a:t>GITHUB: A REDE SOCIAL DOS DESENVOLVEDORES</a:t>
             </a:r>
-            <a:endParaRPr lang="pt-BR" sz="2400" b="1" dirty="0"/>
           </a:p>
         </p:txBody>
       </p:sp>
@@ -7429,7 +7463,7 @@
           <p:cNvPr id="4" name="TextBox 3">
             <a:extLst>
               <a:ext uri="{FF2B5EF4-FFF2-40B4-BE49-F238E27FC236}">
-                <a16:creationId xmlns:a16="http://schemas.microsoft.com/office/drawing/2014/main" xmlns="" id="{B2C256AF-F888-3B4A-87A3-D123362DC6A8}"/>
+                <a16:creationId xmlns="" xmlns:a16="http://schemas.microsoft.com/office/drawing/2014/main" id="{B2C256AF-F888-3B4A-87A3-D123362DC6A8}"/>
               </a:ext>
             </a:extLst>
           </p:cNvPr>
@@ -7523,7 +7557,6 @@
               <a:rPr lang="pt-BR" sz="2400" b="1" dirty="0"/>
               <a:t>GITHUB: A REDE SOCIAL DOS DESENVOLVEDORES</a:t>
             </a:r>
-            <a:endParaRPr lang="pt-BR" sz="2400" b="1" dirty="0"/>
           </a:p>
         </p:txBody>
       </p:sp>

</xml_diff>